<commit_message>
Firewall added; name change; image changes; template change
</commit_message>
<xml_diff>
--- a/Whiteboard design session/WDS trainer presentation - Azure security privacy and compliance.pptx
+++ b/Whiteboard design session/WDS trainer presentation - Azure security privacy and compliance.pptx
@@ -235,7 +235,7 @@
           <a:p>
             <a:fld id="{52A13B17-C506-4D51-BB37-16B365906619}" type="datetimeFigureOut">
               <a:rPr lang="en-US" smtClean="0"/>
-              <a:t>9/5/2018</a:t>
+              <a:t>4/22/2019</a:t>
             </a:fld>
             <a:endParaRPr lang="en-US" dirty="0"/>
           </a:p>
@@ -1141,7 +1141,55 @@
           <a:bodyPr/>
           <a:lstStyle/>
           <a:p>
+            <a:r>
+              <a:rPr lang="en-US" dirty="0"/>
+              <a:t>In this diagram, all internet based web traffic is routed to the Azure Firewall.  From there, it is then forwarded to the back-end web servers and applications.</a:t>
+            </a:r>
+          </a:p>
+          <a:p>
             <a:endParaRPr lang="en-US" dirty="0"/>
+          </a:p>
+          <a:p>
+            <a:r>
+              <a:rPr lang="en-US" dirty="0"/>
+              <a:t>Admin access is locked down via Just in Time (JIT) access to the PAW machine.</a:t>
+            </a:r>
+          </a:p>
+          <a:p>
+            <a:endParaRPr lang="en-US" dirty="0"/>
+          </a:p>
+          <a:p>
+            <a:r>
+              <a:rPr lang="en-US" dirty="0"/>
+              <a:t>Virtual Networks and Network Security Groups limit traffic such that you can only gain access to the PAW machine before you can gain access to any other machines.</a:t>
+            </a:r>
+          </a:p>
+          <a:p>
+            <a:endParaRPr lang="en-US" dirty="0"/>
+          </a:p>
+          <a:p>
+            <a:r>
+              <a:rPr lang="en-US" dirty="0"/>
+              <a:t>Admins can access the Azure Resource Group and resources via Site-to-Site, Point-to-Site and Azure ExpressRoute communications.</a:t>
+            </a:r>
+          </a:p>
+          <a:p>
+            <a:endParaRPr lang="en-US" dirty="0"/>
+          </a:p>
+          <a:p>
+            <a:r>
+              <a:rPr lang="en-US" dirty="0"/>
+              <a:t>Key vault is used to hold all database connection strings and the Web server utilizes MSI identities tied to the virtual machine to gain access to the key vault.</a:t>
+            </a:r>
+          </a:p>
+          <a:p>
+            <a:endParaRPr lang="en-US" dirty="0"/>
+          </a:p>
+          <a:p>
+            <a:r>
+              <a:rPr lang="en-US" dirty="0"/>
+              <a:t>Because of the use of multiple virtual networks, a DNS server has been configured to help the various resources.</a:t>
+            </a:r>
           </a:p>
         </p:txBody>
       </p:sp>
@@ -3380,7 +3428,7 @@
                   <a:prstClr val="black"/>
                 </a:solidFill>
               </a:rPr>
-              <a:t>9/5/2018 11:52 AM</a:t>
+              <a:t>4/22/2019 5:24 PM</a:t>
             </a:fld>
             <a:endParaRPr lang="en-US" dirty="0">
               <a:solidFill>
@@ -17396,10 +17444,10 @@
       </p:sp>
       <p:pic>
         <p:nvPicPr>
-          <p:cNvPr id="4" name="Picture 3" descr="High-level network architecture&#10;&#10;On the left, an Admin icon and an Agent icon point at an internet icon, which points at a box in the middle. In this box are three smaller boxes (WEB-1, PAW-1, and DB-1) that are interconnected with icons for Azure SQL, a DNS server, and an icon of a key on a green circle. The big box in the middle points to four different sites labeled Site 1–4.">
+          <p:cNvPr id="5" name="Picture 4">
             <a:extLst>
               <a:ext uri="{FF2B5EF4-FFF2-40B4-BE49-F238E27FC236}">
-                <a16:creationId xmlns:a16="http://schemas.microsoft.com/office/drawing/2014/main" id="{71E7AC26-E3C5-459E-8429-B19545E57CE8}"/>
+                <a16:creationId xmlns:a16="http://schemas.microsoft.com/office/drawing/2014/main" id="{DAE7A831-BF04-4523-9DD8-62EAEB3230C7}"/>
               </a:ext>
             </a:extLst>
           </p:cNvPr>
@@ -17416,8 +17464,8 @@
         </p:blipFill>
         <p:spPr>
           <a:xfrm>
-            <a:off x="1162050" y="1189176"/>
-            <a:ext cx="9515475" cy="5352454"/>
+            <a:off x="1301053" y="1168806"/>
+            <a:ext cx="9591737" cy="5517721"/>
           </a:xfrm>
           <a:prstGeom prst="rect">
             <a:avLst/>
@@ -17507,10 +17555,10 @@
       </p:sp>
       <p:pic>
         <p:nvPicPr>
-          <p:cNvPr id="5" name="Picture 4" descr="High-level auditing and compliance&#10;&#10;On the left, Admin, DPO, and SIEM icons point at other icons and icons inside another large box. Inside the box are various icons and three smaller boxes with similarly clustered icons: WEB, DB, and Main; DB, Web, and PAW; and DB, Web, and Main.">
+          <p:cNvPr id="3" name="Picture 2">
             <a:extLst>
               <a:ext uri="{FF2B5EF4-FFF2-40B4-BE49-F238E27FC236}">
-                <a16:creationId xmlns:a16="http://schemas.microsoft.com/office/drawing/2014/main" id="{6F6E4702-6FF9-4CE0-A6F0-A3DCA0B4B317}"/>
+                <a16:creationId xmlns:a16="http://schemas.microsoft.com/office/drawing/2014/main" id="{C5610748-3000-4289-8D30-B1A994D3CF28}"/>
               </a:ext>
             </a:extLst>
           </p:cNvPr>
@@ -17527,8 +17575,8 @@
         </p:blipFill>
         <p:spPr>
           <a:xfrm>
-            <a:off x="1143000" y="1285874"/>
-            <a:ext cx="8924925" cy="5020271"/>
+            <a:off x="1579540" y="1166186"/>
+            <a:ext cx="9032919" cy="5402303"/>
           </a:xfrm>
           <a:prstGeom prst="rect">
             <a:avLst/>
@@ -17634,7 +17682,7 @@
         </p:spPr>
         <p:txBody>
           <a:bodyPr>
-            <a:normAutofit fontScale="92500"/>
+            <a:normAutofit fontScale="92500" lnSpcReduction="10000"/>
           </a:bodyPr>
           <a:lstStyle/>
           <a:p>
@@ -17676,6 +17724,19 @@
                 <a:cs typeface="Segoe UI Semilight" panose="020B0402040204020203" pitchFamily="34" charset="0"/>
               </a:rPr>
               <a:t>Multi-factor auth. for all admins, PAW workstations for Azure access with Application Compliance Monitoring.</a:t>
+            </a:r>
+          </a:p>
+          <a:p>
+            <a:pPr marL="737378" lvl="1" indent="-280178"/>
+            <a:r>
+              <a:rPr lang="en-US" sz="3500" dirty="0">
+                <a:solidFill>
+                  <a:schemeClr val="tx1"/>
+                </a:solidFill>
+                <a:latin typeface="Segoe UI Semilight" panose="020B0402040204020203" pitchFamily="34" charset="0"/>
+                <a:cs typeface="Segoe UI Semilight" panose="020B0402040204020203" pitchFamily="34" charset="0"/>
+              </a:rPr>
+              <a:t>Privileged Identity Management (PIM) for elevating admin permissions</a:t>
             </a:r>
           </a:p>
           <a:p>
@@ -17844,7 +17905,7 @@
         </p:spPr>
         <p:txBody>
           <a:bodyPr>
-            <a:normAutofit/>
+            <a:normAutofit lnSpcReduction="10000"/>
           </a:bodyPr>
           <a:lstStyle/>
           <a:p>
@@ -17885,7 +17946,7 @@
                 <a:latin typeface="Segoe UI Semilight" panose="020B0402040204020203" pitchFamily="34" charset="0"/>
                 <a:cs typeface="Segoe UI Semilight" panose="020B0402040204020203" pitchFamily="34" charset="0"/>
               </a:rPr>
-              <a:t>Azure Monitor and Log Analytics with Power BI integration for compliance reporting.</a:t>
+              <a:t>Azure Sentinel, Azure Monitor and Log Analytics with Power BI integration for compliance reporting.</a:t>
             </a:r>
           </a:p>
           <a:p>
@@ -17911,7 +17972,20 @@
                 <a:latin typeface="Segoe UI Semilight" panose="020B0402040204020203" pitchFamily="34" charset="0"/>
                 <a:cs typeface="Segoe UI Semilight" panose="020B0402040204020203" pitchFamily="34" charset="0"/>
               </a:rPr>
-              <a:t>Web applications with Azure Key Vault integration for connection strings.</a:t>
+              <a:t>Web applications with Azure Key Vault integration for storing connection strings with Managed Service Identities (MSI) controlled access</a:t>
+            </a:r>
+          </a:p>
+          <a:p>
+            <a:pPr marL="737378" lvl="1" indent="-280178"/>
+            <a:r>
+              <a:rPr lang="en-US" sz="3592" dirty="0">
+                <a:solidFill>
+                  <a:schemeClr val="tx1"/>
+                </a:solidFill>
+                <a:latin typeface="Segoe UI Semilight" panose="020B0402040204020203" pitchFamily="34" charset="0"/>
+                <a:cs typeface="Segoe UI Semilight" panose="020B0402040204020203" pitchFamily="34" charset="0"/>
+              </a:rPr>
+              <a:t>Azure Firewall to filter internet traffic</a:t>
             </a:r>
             <a:endParaRPr lang="en-US" sz="1800" dirty="0">
               <a:solidFill>
@@ -20772,15 +20846,6 @@
 </file>
 
 <file path=customXml/item2.xml><?xml version="1.0" encoding="utf-8"?>
-<p:properties xmlns:p="http://schemas.microsoft.com/office/2006/metadata/properties" xmlns:xsi="http://www.w3.org/2001/XMLSchema-instance" xmlns:pc="http://schemas.microsoft.com/office/infopath/2007/PartnerControls">
-  <documentManagement>
-    <_ip_UnifiedCompliancePolicyUIAction xmlns="http://schemas.microsoft.com/sharepoint/v3" xsi:nil="true"/>
-    <_ip_UnifiedCompliancePolicyProperties xmlns="http://schemas.microsoft.com/sharepoint/v3" xsi:nil="true"/>
-  </documentManagement>
-</p:properties>
-</file>
-
-<file path=customXml/item3.xml><?xml version="1.0" encoding="utf-8"?>
 <ct:contentTypeSchema xmlns:ct="http://schemas.microsoft.com/office/2006/metadata/contentType" xmlns:ma="http://schemas.microsoft.com/office/2006/metadata/properties/metaAttributes" ct:_="" ma:_="" ma:contentTypeName="Document" ma:contentTypeID="0x010100D15DFA3690A15B4081582BBCC6BEAC3E" ma:contentTypeVersion="9" ma:contentTypeDescription="Create a new document." ma:contentTypeScope="" ma:versionID="642da1784587cbe85a7fdbbe4dc36103">
   <xsd:schema xmlns:xsd="http://www.w3.org/2001/XMLSchema" xmlns:xs="http://www.w3.org/2001/XMLSchema" xmlns:p="http://schemas.microsoft.com/office/2006/metadata/properties" xmlns:ns1="http://schemas.microsoft.com/sharepoint/v3" xmlns:ns2="2023ac63-7b75-4916-a9ee-591457758eee" xmlns:ns3="d9c797ad-d7c3-4982-82b7-81352a75e4a5" targetNamespace="http://schemas.microsoft.com/office/2006/metadata/properties" ma:root="true" ma:fieldsID="91198b0246576053cc55dd2c67035a89" ns1:_="" ns2:_="" ns3:_="">
     <xsd:import namespace="http://schemas.microsoft.com/sharepoint/v3"/>
@@ -20982,6 +21047,15 @@
 </ct:contentTypeSchema>
 </file>
 
+<file path=customXml/item3.xml><?xml version="1.0" encoding="utf-8"?>
+<p:properties xmlns:p="http://schemas.microsoft.com/office/2006/metadata/properties" xmlns:xsi="http://www.w3.org/2001/XMLSchema-instance" xmlns:pc="http://schemas.microsoft.com/office/infopath/2007/PartnerControls">
+  <documentManagement>
+    <_ip_UnifiedCompliancePolicyUIAction xmlns="http://schemas.microsoft.com/sharepoint/v3" xsi:nil="true"/>
+    <_ip_UnifiedCompliancePolicyProperties xmlns="http://schemas.microsoft.com/sharepoint/v3" xsi:nil="true"/>
+  </documentManagement>
+</p:properties>
+</file>
+
 <file path=customXml/itemProps1.xml><?xml version="1.0" encoding="utf-8"?>
 <ds:datastoreItem xmlns:ds="http://schemas.openxmlformats.org/officeDocument/2006/customXml" ds:itemID="{B548A0C0-DC97-4384-A030-1862D9120D4E}">
   <ds:schemaRefs>
@@ -20991,24 +21065,6 @@
 </file>
 
 <file path=customXml/itemProps2.xml><?xml version="1.0" encoding="utf-8"?>
-<ds:datastoreItem xmlns:ds="http://schemas.openxmlformats.org/officeDocument/2006/customXml" ds:itemID="{CE655EA9-4351-4C51-BD9A-4F8469CD6ADD}">
-  <ds:schemaRefs>
-    <ds:schemaRef ds:uri="2023ac63-7b75-4916-a9ee-591457758eee"/>
-    <ds:schemaRef ds:uri="http://purl.org/dc/elements/1.1/"/>
-    <ds:schemaRef ds:uri="http://schemas.microsoft.com/office/2006/metadata/properties"/>
-    <ds:schemaRef ds:uri="http://schemas.microsoft.com/sharepoint/v3"/>
-    <ds:schemaRef ds:uri="http://purl.org/dc/terms/"/>
-    <ds:schemaRef ds:uri="http://schemas.openxmlformats.org/package/2006/metadata/core-properties"/>
-    <ds:schemaRef ds:uri="http://schemas.microsoft.com/office/2006/documentManagement/types"/>
-    <ds:schemaRef ds:uri="http://schemas.microsoft.com/office/infopath/2007/PartnerControls"/>
-    <ds:schemaRef ds:uri="d9c797ad-d7c3-4982-82b7-81352a75e4a5"/>
-    <ds:schemaRef ds:uri="http://www.w3.org/XML/1998/namespace"/>
-    <ds:schemaRef ds:uri="http://purl.org/dc/dcmitype/"/>
-  </ds:schemaRefs>
-</ds:datastoreItem>
-</file>
-
-<file path=customXml/itemProps3.xml><?xml version="1.0" encoding="utf-8"?>
 <ds:datastoreItem xmlns:ds="http://schemas.openxmlformats.org/officeDocument/2006/customXml" ds:itemID="{073ED2AD-E7AD-4156-9686-5BAF016490A0}">
   <ds:schemaRefs>
     <ds:schemaRef ds:uri="http://schemas.microsoft.com/office/2006/metadata/contentType"/>
@@ -21026,4 +21082,22 @@
     <ds:schemaRef ds:uri="http://schemas.microsoft.com/internal/obd"/>
   </ds:schemaRefs>
 </ds:datastoreItem>
+</file>
+
+<file path=customXml/itemProps3.xml><?xml version="1.0" encoding="utf-8"?>
+<ds:datastoreItem xmlns:ds="http://schemas.openxmlformats.org/officeDocument/2006/customXml" ds:itemID="{CE655EA9-4351-4C51-BD9A-4F8469CD6ADD}">
+  <ds:schemaRefs>
+    <ds:schemaRef ds:uri="2023ac63-7b75-4916-a9ee-591457758eee"/>
+    <ds:schemaRef ds:uri="http://purl.org/dc/elements/1.1/"/>
+    <ds:schemaRef ds:uri="http://schemas.microsoft.com/office/2006/metadata/properties"/>
+    <ds:schemaRef ds:uri="http://schemas.microsoft.com/sharepoint/v3"/>
+    <ds:schemaRef ds:uri="http://purl.org/dc/terms/"/>
+    <ds:schemaRef ds:uri="http://schemas.openxmlformats.org/package/2006/metadata/core-properties"/>
+    <ds:schemaRef ds:uri="http://schemas.microsoft.com/office/2006/documentManagement/types"/>
+    <ds:schemaRef ds:uri="http://schemas.microsoft.com/office/infopath/2007/PartnerControls"/>
+    <ds:schemaRef ds:uri="d9c797ad-d7c3-4982-82b7-81352a75e4a5"/>
+    <ds:schemaRef ds:uri="http://www.w3.org/XML/1998/namespace"/>
+    <ds:schemaRef ds:uri="http://purl.org/dc/dcmitype/"/>
+  </ds:schemaRefs>
+</ds:datastoreItem>
 </file>
</xml_diff>